<commit_message>
final commit before archive
</commit_message>
<xml_diff>
--- a/INDUSTRY_ETHICS/IPR.pptx
+++ b/INDUSTRY_ETHICS/IPR.pptx
@@ -159,6 +159,50 @@
 <p:cmAuthorLst xmlns:a="http://schemas.openxmlformats.org/drawingml/2006/main" xmlns:r="http://schemas.openxmlformats.org/officeDocument/2006/relationships" xmlns:p="http://schemas.openxmlformats.org/presentationml/2006/main">
   <p:cmAuthor id="0" name="Robert Fan" initials="RF [9]" lastIdx="1" clrIdx="0"/>
 </p:cmAuthorLst>
+</file>
+
+<file path=ppt/changesInfos/changesInfo1.xml><?xml version="1.0" encoding="utf-8"?>
+<pc:chgInfo xmlns:a="http://schemas.openxmlformats.org/drawingml/2006/main" xmlns:r="http://schemas.openxmlformats.org/officeDocument/2006/relationships" xmlns:ac="http://schemas.microsoft.com/office/drawing/2013/main/command" xmlns:pc="http://schemas.microsoft.com/office/powerpoint/2013/main/command">
+  <pc:docChgLst>
+    <pc:chgData name="Ayan Ruzdan" userId="281b3fb1-178d-4595-a67e-42f3d5782a4e" providerId="ADAL" clId="{68FF9E20-27DD-46D6-BBB7-EE7C24C9B6FD}"/>
+    <pc:docChg chg="undo custSel modSld">
+      <pc:chgData name="Ayan Ruzdan" userId="281b3fb1-178d-4595-a67e-42f3d5782a4e" providerId="ADAL" clId="{68FF9E20-27DD-46D6-BBB7-EE7C24C9B6FD}" dt="2023-12-10T16:09:04.873" v="9" actId="1076"/>
+      <pc:docMkLst>
+        <pc:docMk/>
+      </pc:docMkLst>
+      <pc:sldChg chg="addSp delSp modSp mod">
+        <pc:chgData name="Ayan Ruzdan" userId="281b3fb1-178d-4595-a67e-42f3d5782a4e" providerId="ADAL" clId="{68FF9E20-27DD-46D6-BBB7-EE7C24C9B6FD}" dt="2023-12-10T15:38:25.242" v="6" actId="14100"/>
+        <pc:sldMkLst>
+          <pc:docMk/>
+          <pc:sldMk cId="4115144485" sldId="901"/>
+        </pc:sldMkLst>
+        <pc:spChg chg="add del mod">
+          <ac:chgData name="Ayan Ruzdan" userId="281b3fb1-178d-4595-a67e-42f3d5782a4e" providerId="ADAL" clId="{68FF9E20-27DD-46D6-BBB7-EE7C24C9B6FD}" dt="2023-12-10T15:38:25.242" v="6" actId="14100"/>
+          <ac:spMkLst>
+            <pc:docMk/>
+            <pc:sldMk cId="4115144485" sldId="901"/>
+            <ac:spMk id="4" creationId="{00000000-0000-0000-0000-000000000000}"/>
+          </ac:spMkLst>
+        </pc:spChg>
+      </pc:sldChg>
+      <pc:sldChg chg="modSp mod">
+        <pc:chgData name="Ayan Ruzdan" userId="281b3fb1-178d-4595-a67e-42f3d5782a4e" providerId="ADAL" clId="{68FF9E20-27DD-46D6-BBB7-EE7C24C9B6FD}" dt="2023-12-10T16:09:04.873" v="9" actId="1076"/>
+        <pc:sldMkLst>
+          <pc:docMk/>
+          <pc:sldMk cId="364557847" sldId="983"/>
+        </pc:sldMkLst>
+        <pc:picChg chg="mod">
+          <ac:chgData name="Ayan Ruzdan" userId="281b3fb1-178d-4595-a67e-42f3d5782a4e" providerId="ADAL" clId="{68FF9E20-27DD-46D6-BBB7-EE7C24C9B6FD}" dt="2023-12-10T16:09:04.873" v="9" actId="1076"/>
+          <ac:picMkLst>
+            <pc:docMk/>
+            <pc:sldMk cId="364557847" sldId="983"/>
+            <ac:picMk id="54274" creationId="{00000000-0000-0000-0000-000000000000}"/>
+          </ac:picMkLst>
+        </pc:picChg>
+      </pc:sldChg>
+    </pc:docChg>
+  </pc:docChgLst>
+</pc:chgInfo>
 </file>
 
 <file path=ppt/diagrams/colors1.xml><?xml version="1.0" encoding="utf-8"?>
@@ -3245,7 +3289,7 @@
           <a:p>
             <a:fld id="{260F1319-1E42-4358-B4C7-3DD9C705C0C7}" type="datetimeFigureOut">
               <a:rPr lang="en-IN" smtClean="0"/>
-              <a:t>21-12-2022</a:t>
+              <a:t>10-12-2023</a:t>
             </a:fld>
             <a:endParaRPr lang="en-IN"/>
           </a:p>
@@ -3411,7 +3455,7 @@
             <a:fld id="{5EC353EC-20FA-4ADC-8FC7-3040DCAFF9C3}" type="datetimeFigureOut">
               <a:rPr lang="en-IN" smtClean="0"/>
               <a:pPr/>
-              <a:t>21-12-2022</a:t>
+              <a:t>10-12-2023</a:t>
             </a:fld>
             <a:endParaRPr lang="en-IN"/>
           </a:p>
@@ -5048,7 +5092,7 @@
           <a:p>
             <a:fld id="{046E65AF-8463-48B5-A24B-99A11379F500}" type="datetime1">
               <a:rPr lang="en-IN" smtClean="0"/>
-              <a:t>21-12-2022</a:t>
+              <a:t>10-12-2023</a:t>
             </a:fld>
             <a:endParaRPr lang="en-IN"/>
           </a:p>
@@ -5217,7 +5261,7 @@
           <a:p>
             <a:fld id="{A3EFA666-F16A-4435-B556-4ED4B804CA0A}" type="datetime1">
               <a:rPr lang="en-IN" smtClean="0"/>
-              <a:t>21-12-2022</a:t>
+              <a:t>10-12-2023</a:t>
             </a:fld>
             <a:endParaRPr lang="en-IN"/>
           </a:p>
@@ -5396,7 +5440,7 @@
           <a:p>
             <a:fld id="{DB526F48-E2FF-4C76-B658-AAC16E5C4277}" type="datetime1">
               <a:rPr lang="en-IN" smtClean="0"/>
-              <a:t>21-12-2022</a:t>
+              <a:t>10-12-2023</a:t>
             </a:fld>
             <a:endParaRPr lang="en-IN"/>
           </a:p>
@@ -5995,7 +6039,7 @@
           <a:p>
             <a:fld id="{AE86BA96-907B-4AA1-9B73-6D1C55060320}" type="datetime1">
               <a:rPr lang="en-IN" smtClean="0"/>
-              <a:t>21-12-2022</a:t>
+              <a:t>10-12-2023</a:t>
             </a:fld>
             <a:endParaRPr lang="en-IN"/>
           </a:p>
@@ -6240,7 +6284,7 @@
           <a:p>
             <a:fld id="{9A7E43F5-624A-41ED-91E5-A3B46BB039E1}" type="datetime1">
               <a:rPr lang="en-IN" smtClean="0"/>
-              <a:t>21-12-2022</a:t>
+              <a:t>10-12-2023</a:t>
             </a:fld>
             <a:endParaRPr lang="en-IN"/>
           </a:p>
@@ -6527,7 +6571,7 @@
           <a:p>
             <a:fld id="{1B42ABB6-B7E9-419F-8F41-C223003B8B3A}" type="datetime1">
               <a:rPr lang="en-IN" smtClean="0"/>
-              <a:t>21-12-2022</a:t>
+              <a:t>10-12-2023</a:t>
             </a:fld>
             <a:endParaRPr lang="en-IN"/>
           </a:p>
@@ -6948,7 +6992,7 @@
           <a:p>
             <a:fld id="{CE6F87BA-117B-4580-A605-8AEBE7AF1C78}" type="datetime1">
               <a:rPr lang="en-IN" smtClean="0"/>
-              <a:t>21-12-2022</a:t>
+              <a:t>10-12-2023</a:t>
             </a:fld>
             <a:endParaRPr lang="en-IN"/>
           </a:p>
@@ -7065,7 +7109,7 @@
           <a:p>
             <a:fld id="{E01D08C2-276B-4E02-A668-1CDEA55C364D}" type="datetime1">
               <a:rPr lang="en-IN" smtClean="0"/>
-              <a:t>21-12-2022</a:t>
+              <a:t>10-12-2023</a:t>
             </a:fld>
             <a:endParaRPr lang="en-IN"/>
           </a:p>
@@ -7159,7 +7203,7 @@
           <a:p>
             <a:fld id="{14F0F44F-5053-4B11-BF66-1674BA7D6C96}" type="datetime1">
               <a:rPr lang="en-IN" smtClean="0"/>
-              <a:t>21-12-2022</a:t>
+              <a:t>10-12-2023</a:t>
             </a:fld>
             <a:endParaRPr lang="en-IN"/>
           </a:p>
@@ -7435,7 +7479,7 @@
           <a:p>
             <a:fld id="{CECBD196-AC92-4E27-85EB-59AC0524C9DF}" type="datetime1">
               <a:rPr lang="en-IN" smtClean="0"/>
-              <a:t>21-12-2022</a:t>
+              <a:t>10-12-2023</a:t>
             </a:fld>
             <a:endParaRPr lang="en-IN"/>
           </a:p>
@@ -7687,7 +7731,7 @@
           <a:p>
             <a:fld id="{29552459-A653-44FF-92BC-766C6E723579}" type="datetime1">
               <a:rPr lang="en-IN" smtClean="0"/>
-              <a:t>21-12-2022</a:t>
+              <a:t>10-12-2023</a:t>
             </a:fld>
             <a:endParaRPr lang="en-IN"/>
           </a:p>
@@ -7899,7 +7943,7 @@
           <a:p>
             <a:fld id="{4698D57D-81F6-4621-8575-ADB7CF7F310F}" type="datetime1">
               <a:rPr lang="en-IN" smtClean="0"/>
-              <a:t>21-12-2022</a:t>
+              <a:t>10-12-2023</a:t>
             </a:fld>
             <a:endParaRPr lang="en-IN" dirty="0"/>
           </a:p>
@@ -8441,8 +8485,8 @@
         </p:nvSpPr>
         <p:spPr>
           <a:xfrm>
-            <a:off x="5410200" y="3505200"/>
-            <a:ext cx="2963652" cy="2518136"/>
+            <a:off x="6324599" y="4644664"/>
+            <a:ext cx="2438399" cy="1969178"/>
           </a:xfrm>
           <a:prstGeom prst="rect">
             <a:avLst/>
@@ -8491,6 +8535,13 @@
             </a:schemeClr>
           </a:fontRef>
         </p:style>
+        <p:txBody>
+          <a:bodyPr/>
+          <a:lstStyle/>
+          <a:p>
+            <a:endParaRPr lang="en-IN"/>
+          </a:p>
+        </p:txBody>
       </p:sp>
     </p:spTree>
     <p:extLst>
@@ -9783,8 +9834,8 @@
         </p:blipFill>
         <p:spPr bwMode="auto">
           <a:xfrm>
-            <a:off x="6191492" y="2195286"/>
-            <a:ext cx="2667000" cy="2057400"/>
+            <a:off x="6400800" y="2133600"/>
+            <a:ext cx="1679222" cy="1295400"/>
           </a:xfrm>
           <a:prstGeom prst="roundRect">
             <a:avLst/>
@@ -29735,7 +29786,7 @@
                   <p:embed/>
                   <p:pic>
                     <p:nvPicPr>
-                      <p:cNvPr id="0" name=""/>
+                      <p:cNvPr id="9219" name="Object 3"/>
                       <p:cNvPicPr>
                         <a:picLocks noChangeAspect="1" noChangeArrowheads="1"/>
                       </p:cNvPicPr>

</xml_diff>